<commit_message>
updating powerpoint with new figure
</commit_message>
<xml_diff>
--- a/weekly_meetings/11042022_Presentation.pptx
+++ b/weekly_meetings/11042022_Presentation.pptx
@@ -5,12 +5,18 @@
     <p:sldMasterId id="2147483660" r:id="rId1"/>
   </p:sldMasterIdLst>
   <p:notesMasterIdLst>
-    <p:notesMasterId r:id="rId5"/>
+    <p:notesMasterId r:id="rId11"/>
   </p:notesMasterIdLst>
   <p:sldIdLst>
     <p:sldId id="256" r:id="rId2"/>
     <p:sldId id="303" r:id="rId3"/>
     <p:sldId id="304" r:id="rId4"/>
+    <p:sldId id="309" r:id="rId5"/>
+    <p:sldId id="310" r:id="rId6"/>
+    <p:sldId id="305" r:id="rId7"/>
+    <p:sldId id="306" r:id="rId8"/>
+    <p:sldId id="308" r:id="rId9"/>
+    <p:sldId id="307" r:id="rId10"/>
   </p:sldIdLst>
   <p:sldSz cx="12192000" cy="6858000"/>
   <p:notesSz cx="6858000" cy="9144000"/>
@@ -199,7 +205,7 @@
           <a:p>
             <a:fld id="{91328498-3CBD-7D43-94EE-E4471A402C97}" type="datetimeFigureOut">
               <a:rPr lang="en-US" smtClean="0"/>
-              <a:t>10/27/22</a:t>
+              <a:t>11/4/22</a:t>
             </a:fld>
             <a:endParaRPr lang="en-US"/>
           </a:p>
@@ -636,7 +642,7 @@
           <a:p>
             <a:fld id="{AF20C1CE-0746-944E-92A7-6604E73DE184}" type="datetimeFigureOut">
               <a:rPr lang="en-US" smtClean="0"/>
-              <a:t>10/27/22</a:t>
+              <a:t>11/4/22</a:t>
             </a:fld>
             <a:endParaRPr lang="en-US"/>
           </a:p>
@@ -903,7 +909,7 @@
           <a:p>
             <a:fld id="{AF20C1CE-0746-944E-92A7-6604E73DE184}" type="datetimeFigureOut">
               <a:rPr lang="en-US" smtClean="0"/>
-              <a:t>10/27/22</a:t>
+              <a:t>11/4/22</a:t>
             </a:fld>
             <a:endParaRPr lang="en-US"/>
           </a:p>
@@ -1134,7 +1140,7 @@
           <a:p>
             <a:fld id="{AF20C1CE-0746-944E-92A7-6604E73DE184}" type="datetimeFigureOut">
               <a:rPr lang="en-US" smtClean="0"/>
-              <a:t>10/27/22</a:t>
+              <a:t>11/4/22</a:t>
             </a:fld>
             <a:endParaRPr lang="en-US"/>
           </a:p>
@@ -1444,7 +1450,7 @@
           <a:p>
             <a:fld id="{AF20C1CE-0746-944E-92A7-6604E73DE184}" type="datetimeFigureOut">
               <a:rPr lang="en-US" smtClean="0"/>
-              <a:t>10/27/22</a:t>
+              <a:t>11/4/22</a:t>
             </a:fld>
             <a:endParaRPr lang="en-US"/>
           </a:p>
@@ -1917,7 +1923,7 @@
           <a:p>
             <a:fld id="{AF20C1CE-0746-944E-92A7-6604E73DE184}" type="datetimeFigureOut">
               <a:rPr lang="en-US" smtClean="0"/>
-              <a:t>10/27/22</a:t>
+              <a:t>11/4/22</a:t>
             </a:fld>
             <a:endParaRPr lang="en-US"/>
           </a:p>
@@ -2464,7 +2470,7 @@
           <a:p>
             <a:fld id="{AF20C1CE-0746-944E-92A7-6604E73DE184}" type="datetimeFigureOut">
               <a:rPr lang="en-US" smtClean="0"/>
-              <a:t>10/27/22</a:t>
+              <a:t>11/4/22</a:t>
             </a:fld>
             <a:endParaRPr lang="en-US"/>
           </a:p>
@@ -3238,7 +3244,7 @@
           <a:p>
             <a:fld id="{AF20C1CE-0746-944E-92A7-6604E73DE184}" type="datetimeFigureOut">
               <a:rPr lang="en-US" smtClean="0"/>
-              <a:t>10/27/22</a:t>
+              <a:t>11/4/22</a:t>
             </a:fld>
             <a:endParaRPr lang="en-US"/>
           </a:p>
@@ -3413,7 +3419,7 @@
           <a:p>
             <a:fld id="{AF20C1CE-0746-944E-92A7-6604E73DE184}" type="datetimeFigureOut">
               <a:rPr lang="en-US" smtClean="0"/>
-              <a:t>10/27/22</a:t>
+              <a:t>11/4/22</a:t>
             </a:fld>
             <a:endParaRPr lang="en-US"/>
           </a:p>
@@ -3636,7 +3642,7 @@
           <a:p>
             <a:fld id="{AF20C1CE-0746-944E-92A7-6604E73DE184}" type="datetimeFigureOut">
               <a:rPr lang="en-US" smtClean="0"/>
-              <a:t>10/27/22</a:t>
+              <a:t>11/4/22</a:t>
             </a:fld>
             <a:endParaRPr lang="en-US"/>
           </a:p>
@@ -3816,7 +3822,7 @@
           <a:p>
             <a:fld id="{AF20C1CE-0746-944E-92A7-6604E73DE184}" type="datetimeFigureOut">
               <a:rPr lang="en-US" smtClean="0"/>
-              <a:t>10/27/22</a:t>
+              <a:t>11/4/22</a:t>
             </a:fld>
             <a:endParaRPr lang="en-US"/>
           </a:p>
@@ -4105,7 +4111,7 @@
           <a:p>
             <a:fld id="{AF20C1CE-0746-944E-92A7-6604E73DE184}" type="datetimeFigureOut">
               <a:rPr lang="en-US" smtClean="0"/>
-              <a:t>10/27/22</a:t>
+              <a:t>11/4/22</a:t>
             </a:fld>
             <a:endParaRPr lang="en-US"/>
           </a:p>
@@ -4347,7 +4353,7 @@
           <a:p>
             <a:fld id="{AF20C1CE-0746-944E-92A7-6604E73DE184}" type="datetimeFigureOut">
               <a:rPr lang="en-US" smtClean="0"/>
-              <a:t>10/27/22</a:t>
+              <a:t>11/4/22</a:t>
             </a:fld>
             <a:endParaRPr lang="en-US"/>
           </a:p>
@@ -4726,7 +4732,7 @@
           <a:p>
             <a:fld id="{AF20C1CE-0746-944E-92A7-6604E73DE184}" type="datetimeFigureOut">
               <a:rPr lang="en-US" smtClean="0"/>
-              <a:t>10/27/22</a:t>
+              <a:t>11/4/22</a:t>
             </a:fld>
             <a:endParaRPr lang="en-US"/>
           </a:p>
@@ -4844,7 +4850,7 @@
           <a:p>
             <a:fld id="{AF20C1CE-0746-944E-92A7-6604E73DE184}" type="datetimeFigureOut">
               <a:rPr lang="en-US" smtClean="0"/>
-              <a:t>10/27/22</a:t>
+              <a:t>11/4/22</a:t>
             </a:fld>
             <a:endParaRPr lang="en-US"/>
           </a:p>
@@ -4939,7 +4945,7 @@
           <a:p>
             <a:fld id="{AF20C1CE-0746-944E-92A7-6604E73DE184}" type="datetimeFigureOut">
               <a:rPr lang="en-US" smtClean="0"/>
-              <a:t>10/27/22</a:t>
+              <a:t>11/4/22</a:t>
             </a:fld>
             <a:endParaRPr lang="en-US"/>
           </a:p>
@@ -5188,7 +5194,7 @@
           <a:p>
             <a:fld id="{AF20C1CE-0746-944E-92A7-6604E73DE184}" type="datetimeFigureOut">
               <a:rPr lang="en-US" smtClean="0"/>
-              <a:t>10/27/22</a:t>
+              <a:t>11/4/22</a:t>
             </a:fld>
             <a:endParaRPr lang="en-US"/>
           </a:p>
@@ -5445,7 +5451,7 @@
           <a:p>
             <a:fld id="{AF20C1CE-0746-944E-92A7-6604E73DE184}" type="datetimeFigureOut">
               <a:rPr lang="en-US" smtClean="0"/>
-              <a:t>10/27/22</a:t>
+              <a:t>11/4/22</a:t>
             </a:fld>
             <a:endParaRPr lang="en-US"/>
           </a:p>
@@ -5688,7 +5694,7 @@
           <a:p>
             <a:fld id="{AF20C1CE-0746-944E-92A7-6604E73DE184}" type="datetimeFigureOut">
               <a:rPr lang="en-US" smtClean="0"/>
-              <a:t>10/27/22</a:t>
+              <a:t>11/4/22</a:t>
             </a:fld>
             <a:endParaRPr lang="en-US"/>
           </a:p>
@@ -6287,15 +6293,17 @@
             </a:r>
           </a:p>
           <a:p>
+            <a:pPr lvl="1"/>
             <a:r>
               <a:rPr lang="en-US" dirty="0"/>
-              <a:t>Analyze the wind speeds from the 10m and 5m </a:t>
-            </a:r>
-            <a:r>
-              <a:rPr lang="en-US"/>
-              <a:t>resolution simulations</a:t>
-            </a:r>
-            <a:endParaRPr lang="en-US" dirty="0"/>
+              <a:t>Complete</a:t>
+            </a:r>
+          </a:p>
+          <a:p>
+            <a:r>
+              <a:rPr lang="en-US" dirty="0"/>
+              <a:t>Analyze the wind speeds from the 10m and 5m resolution simulations</a:t>
+            </a:r>
           </a:p>
           <a:p>
             <a:r>
@@ -6415,6 +6423,772 @@
     <p:extLst>
       <p:ext uri="{BB962C8B-B14F-4D97-AF65-F5344CB8AC3E}">
         <p14:creationId xmlns:p14="http://schemas.microsoft.com/office/powerpoint/2010/main" val="3881031321"/>
+      </p:ext>
+    </p:extLst>
+  </p:cSld>
+  <p:clrMapOvr>
+    <a:masterClrMapping/>
+  </p:clrMapOvr>
+</p:sld>
+</file>
+
+<file path=ppt/slides/slide4.xml><?xml version="1.0" encoding="utf-8"?>
+<p:sld xmlns:a="http://schemas.openxmlformats.org/drawingml/2006/main" xmlns:r="http://schemas.openxmlformats.org/officeDocument/2006/relationships" xmlns:p="http://schemas.openxmlformats.org/presentationml/2006/main">
+  <p:cSld>
+    <p:spTree>
+      <p:nvGrpSpPr>
+        <p:cNvPr id="1" name=""/>
+        <p:cNvGrpSpPr/>
+        <p:nvPr/>
+      </p:nvGrpSpPr>
+      <p:grpSpPr>
+        <a:xfrm>
+          <a:off x="0" y="0"/>
+          <a:ext cx="0" cy="0"/>
+          <a:chOff x="0" y="0"/>
+          <a:chExt cx="0" cy="0"/>
+        </a:xfrm>
+      </p:grpSpPr>
+      <p:sp>
+        <p:nvSpPr>
+          <p:cNvPr id="2" name="Title 1">
+            <a:extLst>
+              <a:ext uri="{FF2B5EF4-FFF2-40B4-BE49-F238E27FC236}">
+                <a16:creationId xmlns:a16="http://schemas.microsoft.com/office/drawing/2014/main" id="{E767CFB5-42B5-8A47-D219-1F1412C2B380}"/>
+              </a:ext>
+            </a:extLst>
+          </p:cNvPr>
+          <p:cNvSpPr>
+            <a:spLocks noGrp="1"/>
+          </p:cNvSpPr>
+          <p:nvPr>
+            <p:ph type="title"/>
+          </p:nvPr>
+        </p:nvSpPr>
+        <p:spPr>
+          <a:xfrm>
+            <a:off x="3181711" y="1026544"/>
+            <a:ext cx="8610600" cy="1293028"/>
+          </a:xfrm>
+        </p:spPr>
+        <p:txBody>
+          <a:bodyPr/>
+          <a:lstStyle/>
+          <a:p>
+            <a:r>
+              <a:rPr lang="en-US" dirty="0"/>
+              <a:t>Compare the Thermocouple data to the simulation</a:t>
+            </a:r>
+          </a:p>
+        </p:txBody>
+      </p:sp>
+      <p:pic>
+        <p:nvPicPr>
+          <p:cNvPr id="5" name="Picture 4">
+            <a:extLst>
+              <a:ext uri="{FF2B5EF4-FFF2-40B4-BE49-F238E27FC236}">
+                <a16:creationId xmlns:a16="http://schemas.microsoft.com/office/drawing/2014/main" id="{C2E70E81-5EF2-C9FD-FF2D-ACD27ECC286E}"/>
+              </a:ext>
+            </a:extLst>
+          </p:cNvPr>
+          <p:cNvPicPr>
+            <a:picLocks noChangeAspect="1"/>
+          </p:cNvPicPr>
+          <p:nvPr/>
+        </p:nvPicPr>
+        <p:blipFill>
+          <a:blip r:embed="rId2"/>
+          <a:stretch>
+            <a:fillRect/>
+          </a:stretch>
+        </p:blipFill>
+        <p:spPr>
+          <a:xfrm>
+            <a:off x="6522722" y="2822723"/>
+            <a:ext cx="5669280" cy="4035277"/>
+          </a:xfrm>
+          <a:prstGeom prst="rect">
+            <a:avLst/>
+          </a:prstGeom>
+        </p:spPr>
+      </p:pic>
+      <p:pic>
+        <p:nvPicPr>
+          <p:cNvPr id="6" name="Picture 5">
+            <a:extLst>
+              <a:ext uri="{FF2B5EF4-FFF2-40B4-BE49-F238E27FC236}">
+                <a16:creationId xmlns:a16="http://schemas.microsoft.com/office/drawing/2014/main" id="{BE5B3162-B62E-0E67-2CA2-F9F17A0E9C27}"/>
+              </a:ext>
+            </a:extLst>
+          </p:cNvPr>
+          <p:cNvPicPr>
+            <a:picLocks noChangeAspect="1"/>
+          </p:cNvPicPr>
+          <p:nvPr/>
+        </p:nvPicPr>
+        <p:blipFill>
+          <a:blip r:embed="rId3"/>
+          <a:stretch>
+            <a:fillRect/>
+          </a:stretch>
+        </p:blipFill>
+        <p:spPr>
+          <a:xfrm>
+            <a:off x="412510" y="2822723"/>
+            <a:ext cx="5683489" cy="4035277"/>
+          </a:xfrm>
+          <a:prstGeom prst="rect">
+            <a:avLst/>
+          </a:prstGeom>
+        </p:spPr>
+      </p:pic>
+    </p:spTree>
+    <p:extLst>
+      <p:ext uri="{BB962C8B-B14F-4D97-AF65-F5344CB8AC3E}">
+        <p14:creationId xmlns:p14="http://schemas.microsoft.com/office/powerpoint/2010/main" val="2920470170"/>
+      </p:ext>
+    </p:extLst>
+  </p:cSld>
+  <p:clrMapOvr>
+    <a:masterClrMapping/>
+  </p:clrMapOvr>
+</p:sld>
+</file>
+
+<file path=ppt/slides/slide5.xml><?xml version="1.0" encoding="utf-8"?>
+<p:sld xmlns:a="http://schemas.openxmlformats.org/drawingml/2006/main" xmlns:r="http://schemas.openxmlformats.org/officeDocument/2006/relationships" xmlns:p="http://schemas.openxmlformats.org/presentationml/2006/main">
+  <p:cSld>
+    <p:spTree>
+      <p:nvGrpSpPr>
+        <p:cNvPr id="1" name=""/>
+        <p:cNvGrpSpPr/>
+        <p:nvPr/>
+      </p:nvGrpSpPr>
+      <p:grpSpPr>
+        <a:xfrm>
+          <a:off x="0" y="0"/>
+          <a:ext cx="0" cy="0"/>
+          <a:chOff x="0" y="0"/>
+          <a:chExt cx="0" cy="0"/>
+        </a:xfrm>
+      </p:grpSpPr>
+      <p:sp>
+        <p:nvSpPr>
+          <p:cNvPr id="2" name="Title 1">
+            <a:extLst>
+              <a:ext uri="{FF2B5EF4-FFF2-40B4-BE49-F238E27FC236}">
+                <a16:creationId xmlns:a16="http://schemas.microsoft.com/office/drawing/2014/main" id="{E767CFB5-42B5-8A47-D219-1F1412C2B380}"/>
+              </a:ext>
+            </a:extLst>
+          </p:cNvPr>
+          <p:cNvSpPr>
+            <a:spLocks noGrp="1"/>
+          </p:cNvSpPr>
+          <p:nvPr>
+            <p:ph type="title"/>
+          </p:nvPr>
+        </p:nvSpPr>
+        <p:spPr/>
+        <p:txBody>
+          <a:bodyPr/>
+          <a:lstStyle/>
+          <a:p>
+            <a:r>
+              <a:rPr lang="en-US" dirty="0"/>
+              <a:t>Compare the Thermocouple data to the simulation</a:t>
+            </a:r>
+          </a:p>
+        </p:txBody>
+      </p:sp>
+      <p:pic>
+        <p:nvPicPr>
+          <p:cNvPr id="6" name="Picture 5">
+            <a:extLst>
+              <a:ext uri="{FF2B5EF4-FFF2-40B4-BE49-F238E27FC236}">
+                <a16:creationId xmlns:a16="http://schemas.microsoft.com/office/drawing/2014/main" id="{C997040E-F02A-61A6-61DE-A2B04816BB99}"/>
+              </a:ext>
+            </a:extLst>
+          </p:cNvPr>
+          <p:cNvPicPr>
+            <a:picLocks noChangeAspect="1"/>
+          </p:cNvPicPr>
+          <p:nvPr/>
+        </p:nvPicPr>
+        <p:blipFill>
+          <a:blip r:embed="rId2"/>
+          <a:stretch>
+            <a:fillRect/>
+          </a:stretch>
+        </p:blipFill>
+        <p:spPr>
+          <a:xfrm>
+            <a:off x="3381196" y="2807419"/>
+            <a:ext cx="5067300" cy="3606800"/>
+          </a:xfrm>
+          <a:prstGeom prst="rect">
+            <a:avLst/>
+          </a:prstGeom>
+        </p:spPr>
+      </p:pic>
+    </p:spTree>
+    <p:extLst>
+      <p:ext uri="{BB962C8B-B14F-4D97-AF65-F5344CB8AC3E}">
+        <p14:creationId xmlns:p14="http://schemas.microsoft.com/office/powerpoint/2010/main" val="4123879202"/>
+      </p:ext>
+    </p:extLst>
+  </p:cSld>
+  <p:clrMapOvr>
+    <a:masterClrMapping/>
+  </p:clrMapOvr>
+</p:sld>
+</file>
+
+<file path=ppt/slides/slide6.xml><?xml version="1.0" encoding="utf-8"?>
+<p:sld xmlns:a="http://schemas.openxmlformats.org/drawingml/2006/main" xmlns:r="http://schemas.openxmlformats.org/officeDocument/2006/relationships" xmlns:p="http://schemas.openxmlformats.org/presentationml/2006/main">
+  <p:cSld>
+    <p:spTree>
+      <p:nvGrpSpPr>
+        <p:cNvPr id="1" name=""/>
+        <p:cNvGrpSpPr/>
+        <p:nvPr/>
+      </p:nvGrpSpPr>
+      <p:grpSpPr>
+        <a:xfrm>
+          <a:off x="0" y="0"/>
+          <a:ext cx="0" cy="0"/>
+          <a:chOff x="0" y="0"/>
+          <a:chExt cx="0" cy="0"/>
+        </a:xfrm>
+      </p:grpSpPr>
+      <p:sp>
+        <p:nvSpPr>
+          <p:cNvPr id="2" name="Title 1">
+            <a:extLst>
+              <a:ext uri="{FF2B5EF4-FFF2-40B4-BE49-F238E27FC236}">
+                <a16:creationId xmlns:a16="http://schemas.microsoft.com/office/drawing/2014/main" id="{B55782F0-9981-04F5-3032-AFA7D906DA9A}"/>
+              </a:ext>
+            </a:extLst>
+          </p:cNvPr>
+          <p:cNvSpPr>
+            <a:spLocks noGrp="1"/>
+          </p:cNvSpPr>
+          <p:nvPr>
+            <p:ph type="title"/>
+          </p:nvPr>
+        </p:nvSpPr>
+        <p:spPr/>
+        <p:txBody>
+          <a:bodyPr/>
+          <a:lstStyle/>
+          <a:p>
+            <a:r>
+              <a:rPr lang="en-US" dirty="0"/>
+              <a:t>Problems with </a:t>
+            </a:r>
+            <a:r>
+              <a:rPr lang="en-US" dirty="0" err="1"/>
+              <a:t>tc</a:t>
+            </a:r>
+            <a:r>
+              <a:rPr lang="en-US" dirty="0"/>
+              <a:t> data</a:t>
+            </a:r>
+          </a:p>
+        </p:txBody>
+      </p:sp>
+      <p:sp>
+        <p:nvSpPr>
+          <p:cNvPr id="3" name="Content Placeholder 2">
+            <a:extLst>
+              <a:ext uri="{FF2B5EF4-FFF2-40B4-BE49-F238E27FC236}">
+                <a16:creationId xmlns:a16="http://schemas.microsoft.com/office/drawing/2014/main" id="{D4A497DD-C81E-B5F4-AA43-703C44118EAC}"/>
+              </a:ext>
+            </a:extLst>
+          </p:cNvPr>
+          <p:cNvSpPr>
+            <a:spLocks noGrp="1"/>
+          </p:cNvSpPr>
+          <p:nvPr>
+            <p:ph idx="1"/>
+          </p:nvPr>
+        </p:nvSpPr>
+        <p:spPr/>
+        <p:txBody>
+          <a:bodyPr/>
+          <a:lstStyle/>
+          <a:p>
+            <a:r>
+              <a:rPr lang="en-US" dirty="0"/>
+              <a:t>A lot of the lower level data contains NAN values, which produces plots that look like </a:t>
+            </a:r>
+          </a:p>
+          <a:p>
+            <a:endParaRPr lang="en-US" dirty="0"/>
+          </a:p>
+          <a:p>
+            <a:endParaRPr lang="en-US" dirty="0"/>
+          </a:p>
+          <a:p>
+            <a:endParaRPr lang="en-US" dirty="0"/>
+          </a:p>
+          <a:p>
+            <a:endParaRPr lang="en-US" dirty="0"/>
+          </a:p>
+          <a:p>
+            <a:r>
+              <a:rPr lang="en-US" dirty="0"/>
+              <a:t>I have tried to remove the nan values but I’m not sure if this data can be used so I left it out for now</a:t>
+            </a:r>
+          </a:p>
+        </p:txBody>
+      </p:sp>
+      <p:pic>
+        <p:nvPicPr>
+          <p:cNvPr id="4" name="Picture 3">
+            <a:extLst>
+              <a:ext uri="{FF2B5EF4-FFF2-40B4-BE49-F238E27FC236}">
+                <a16:creationId xmlns:a16="http://schemas.microsoft.com/office/drawing/2014/main" id="{115C8E96-D09F-239A-DBD1-570EA98A6BC7}"/>
+              </a:ext>
+            </a:extLst>
+          </p:cNvPr>
+          <p:cNvPicPr>
+            <a:picLocks noChangeAspect="1"/>
+          </p:cNvPicPr>
+          <p:nvPr/>
+        </p:nvPicPr>
+        <p:blipFill>
+          <a:blip r:embed="rId2"/>
+          <a:stretch>
+            <a:fillRect/>
+          </a:stretch>
+        </p:blipFill>
+        <p:spPr>
+          <a:xfrm>
+            <a:off x="2169717" y="2631821"/>
+            <a:ext cx="2954374" cy="1908033"/>
+          </a:xfrm>
+          <a:prstGeom prst="rect">
+            <a:avLst/>
+          </a:prstGeom>
+        </p:spPr>
+      </p:pic>
+    </p:spTree>
+    <p:extLst>
+      <p:ext uri="{BB962C8B-B14F-4D97-AF65-F5344CB8AC3E}">
+        <p14:creationId xmlns:p14="http://schemas.microsoft.com/office/powerpoint/2010/main" val="3002455567"/>
+      </p:ext>
+    </p:extLst>
+  </p:cSld>
+  <p:clrMapOvr>
+    <a:masterClrMapping/>
+  </p:clrMapOvr>
+</p:sld>
+</file>
+
+<file path=ppt/slides/slide7.xml><?xml version="1.0" encoding="utf-8"?>
+<p:sld xmlns:a="http://schemas.openxmlformats.org/drawingml/2006/main" xmlns:r="http://schemas.openxmlformats.org/officeDocument/2006/relationships" xmlns:p="http://schemas.openxmlformats.org/presentationml/2006/main">
+  <p:cSld>
+    <p:spTree>
+      <p:nvGrpSpPr>
+        <p:cNvPr id="1" name=""/>
+        <p:cNvGrpSpPr/>
+        <p:nvPr/>
+      </p:nvGrpSpPr>
+      <p:grpSpPr>
+        <a:xfrm>
+          <a:off x="0" y="0"/>
+          <a:ext cx="0" cy="0"/>
+          <a:chOff x="0" y="0"/>
+          <a:chExt cx="0" cy="0"/>
+        </a:xfrm>
+      </p:grpSpPr>
+      <p:sp>
+        <p:nvSpPr>
+          <p:cNvPr id="2" name="Title 1">
+            <a:extLst>
+              <a:ext uri="{FF2B5EF4-FFF2-40B4-BE49-F238E27FC236}">
+                <a16:creationId xmlns:a16="http://schemas.microsoft.com/office/drawing/2014/main" id="{C157CC97-F923-E71F-53D1-7E87AAAFE214}"/>
+              </a:ext>
+            </a:extLst>
+          </p:cNvPr>
+          <p:cNvSpPr>
+            <a:spLocks noGrp="1"/>
+          </p:cNvSpPr>
+          <p:nvPr>
+            <p:ph type="title"/>
+          </p:nvPr>
+        </p:nvSpPr>
+        <p:spPr/>
+        <p:txBody>
+          <a:bodyPr/>
+          <a:lstStyle/>
+          <a:p>
+            <a:r>
+              <a:rPr lang="en-US" dirty="0"/>
+              <a:t>Progress on </a:t>
+            </a:r>
+            <a:r>
+              <a:rPr lang="en-US" dirty="0" err="1"/>
+              <a:t>LaTex</a:t>
+            </a:r>
+            <a:endParaRPr lang="en-US" dirty="0"/>
+          </a:p>
+        </p:txBody>
+      </p:sp>
+      <p:sp>
+        <p:nvSpPr>
+          <p:cNvPr id="3" name="Content Placeholder 2">
+            <a:extLst>
+              <a:ext uri="{FF2B5EF4-FFF2-40B4-BE49-F238E27FC236}">
+                <a16:creationId xmlns:a16="http://schemas.microsoft.com/office/drawing/2014/main" id="{32843A75-E60E-2CAD-3935-39E706F5D669}"/>
+              </a:ext>
+            </a:extLst>
+          </p:cNvPr>
+          <p:cNvSpPr>
+            <a:spLocks noGrp="1"/>
+          </p:cNvSpPr>
+          <p:nvPr>
+            <p:ph idx="1"/>
+          </p:nvPr>
+        </p:nvSpPr>
+        <p:spPr/>
+        <p:txBody>
+          <a:bodyPr/>
+          <a:lstStyle/>
+          <a:p>
+            <a:r>
+              <a:rPr lang="en-US" dirty="0"/>
+              <a:t>In my meeting with </a:t>
+            </a:r>
+            <a:r>
+              <a:rPr lang="en-US" dirty="0" err="1"/>
+              <a:t>Aurélien</a:t>
+            </a:r>
+            <a:r>
+              <a:rPr lang="en-US" dirty="0"/>
+              <a:t>, he showed me latex and I really wanted to learn it since it looked more professional</a:t>
+            </a:r>
+          </a:p>
+          <a:p>
+            <a:r>
+              <a:rPr lang="en-US" dirty="0"/>
+              <a:t>With the recent 164 project, I decided to write it all in latex</a:t>
+            </a:r>
+          </a:p>
+          <a:p>
+            <a:endParaRPr lang="en-US" dirty="0"/>
+          </a:p>
+        </p:txBody>
+      </p:sp>
+      <p:pic>
+        <p:nvPicPr>
+          <p:cNvPr id="4" name="Picture 3">
+            <a:extLst>
+              <a:ext uri="{FF2B5EF4-FFF2-40B4-BE49-F238E27FC236}">
+                <a16:creationId xmlns:a16="http://schemas.microsoft.com/office/drawing/2014/main" id="{9F7AE8D1-A29C-8FD3-CBCA-17EDBF968A12}"/>
+              </a:ext>
+            </a:extLst>
+          </p:cNvPr>
+          <p:cNvPicPr>
+            <a:picLocks noChangeAspect="1"/>
+          </p:cNvPicPr>
+          <p:nvPr/>
+        </p:nvPicPr>
+        <p:blipFill>
+          <a:blip r:embed="rId2"/>
+          <a:stretch>
+            <a:fillRect/>
+          </a:stretch>
+        </p:blipFill>
+        <p:spPr>
+          <a:xfrm>
+            <a:off x="1043609" y="3429000"/>
+            <a:ext cx="5052391" cy="3161043"/>
+          </a:xfrm>
+          <a:prstGeom prst="rect">
+            <a:avLst/>
+          </a:prstGeom>
+        </p:spPr>
+      </p:pic>
+    </p:spTree>
+    <p:extLst>
+      <p:ext uri="{BB962C8B-B14F-4D97-AF65-F5344CB8AC3E}">
+        <p14:creationId xmlns:p14="http://schemas.microsoft.com/office/powerpoint/2010/main" val="2433384744"/>
+      </p:ext>
+    </p:extLst>
+  </p:cSld>
+  <p:clrMapOvr>
+    <a:masterClrMapping/>
+  </p:clrMapOvr>
+</p:sld>
+</file>
+
+<file path=ppt/slides/slide8.xml><?xml version="1.0" encoding="utf-8"?>
+<p:sld xmlns:a="http://schemas.openxmlformats.org/drawingml/2006/main" xmlns:r="http://schemas.openxmlformats.org/officeDocument/2006/relationships" xmlns:p="http://schemas.openxmlformats.org/presentationml/2006/main">
+  <p:cSld>
+    <p:spTree>
+      <p:nvGrpSpPr>
+        <p:cNvPr id="1" name=""/>
+        <p:cNvGrpSpPr/>
+        <p:nvPr/>
+      </p:nvGrpSpPr>
+      <p:grpSpPr>
+        <a:xfrm>
+          <a:off x="0" y="0"/>
+          <a:ext cx="0" cy="0"/>
+          <a:chOff x="0" y="0"/>
+          <a:chExt cx="0" cy="0"/>
+        </a:xfrm>
+      </p:grpSpPr>
+      <p:sp>
+        <p:nvSpPr>
+          <p:cNvPr id="2" name="Title 1">
+            <a:extLst>
+              <a:ext uri="{FF2B5EF4-FFF2-40B4-BE49-F238E27FC236}">
+                <a16:creationId xmlns:a16="http://schemas.microsoft.com/office/drawing/2014/main" id="{1379F9FF-5F3B-A440-7F70-936C8E2A7320}"/>
+              </a:ext>
+            </a:extLst>
+          </p:cNvPr>
+          <p:cNvSpPr>
+            <a:spLocks noGrp="1"/>
+          </p:cNvSpPr>
+          <p:nvPr>
+            <p:ph type="title"/>
+          </p:nvPr>
+        </p:nvSpPr>
+        <p:spPr/>
+        <p:txBody>
+          <a:bodyPr/>
+          <a:lstStyle/>
+          <a:p>
+            <a:r>
+              <a:rPr lang="en-US" dirty="0"/>
+              <a:t>Nasa server</a:t>
+            </a:r>
+          </a:p>
+        </p:txBody>
+      </p:sp>
+      <p:sp>
+        <p:nvSpPr>
+          <p:cNvPr id="3" name="Content Placeholder 2">
+            <a:extLst>
+              <a:ext uri="{FF2B5EF4-FFF2-40B4-BE49-F238E27FC236}">
+                <a16:creationId xmlns:a16="http://schemas.microsoft.com/office/drawing/2014/main" id="{D3892A34-A233-BDF3-4A47-BF7FBE3D1EBB}"/>
+              </a:ext>
+            </a:extLst>
+          </p:cNvPr>
+          <p:cNvSpPr>
+            <a:spLocks noGrp="1"/>
+          </p:cNvSpPr>
+          <p:nvPr>
+            <p:ph idx="1"/>
+          </p:nvPr>
+        </p:nvSpPr>
+        <p:spPr/>
+        <p:txBody>
+          <a:bodyPr/>
+          <a:lstStyle/>
+          <a:p>
+            <a:r>
+              <a:rPr lang="en-US" dirty="0"/>
+              <a:t>I was limited by the number of files in my nobackupp10 directory (it was mainly due to anaconda)</a:t>
+            </a:r>
+          </a:p>
+          <a:p>
+            <a:r>
+              <a:rPr lang="en-US" dirty="0"/>
+              <a:t>WPS_GEOG was also becoming a problem since it too has a lot of files</a:t>
+            </a:r>
+          </a:p>
+          <a:p>
+            <a:pPr lvl="1"/>
+            <a:r>
+              <a:rPr lang="en-US" dirty="0"/>
+              <a:t>I moved a bunch of files to my </a:t>
+            </a:r>
+            <a:r>
+              <a:rPr lang="en-US" dirty="0" err="1"/>
+              <a:t>swbuild</a:t>
+            </a:r>
+            <a:r>
+              <a:rPr lang="en-US" dirty="0"/>
+              <a:t> directory in hopes I could relieve my nobackupp10 directory but this didn’t work</a:t>
+            </a:r>
+          </a:p>
+          <a:p>
+            <a:r>
+              <a:rPr lang="en-US" dirty="0"/>
+              <a:t>I emailed support and within the same day I got my quota increased to 900000 files</a:t>
+            </a:r>
+          </a:p>
+          <a:p>
+            <a:r>
+              <a:rPr lang="en-US" dirty="0"/>
+              <a:t>As a result, I should be able to start building </a:t>
+            </a:r>
+            <a:r>
+              <a:rPr lang="en-US" dirty="0" err="1"/>
+              <a:t>wrfxpy</a:t>
+            </a:r>
+            <a:endParaRPr lang="en-US" dirty="0"/>
+          </a:p>
+          <a:p>
+            <a:r>
+              <a:rPr lang="en-US" dirty="0"/>
+              <a:t>I removed anaconda and installed </a:t>
+            </a:r>
+            <a:r>
+              <a:rPr lang="en-US" dirty="0" err="1"/>
+              <a:t>miniconda</a:t>
+            </a:r>
+            <a:r>
+              <a:rPr lang="en-US" dirty="0"/>
+              <a:t> as well and I put that on my home since that’s currently empty</a:t>
+            </a:r>
+          </a:p>
+        </p:txBody>
+      </p:sp>
+    </p:spTree>
+    <p:extLst>
+      <p:ext uri="{BB962C8B-B14F-4D97-AF65-F5344CB8AC3E}">
+        <p14:creationId xmlns:p14="http://schemas.microsoft.com/office/powerpoint/2010/main" val="1372326564"/>
+      </p:ext>
+    </p:extLst>
+  </p:cSld>
+  <p:clrMapOvr>
+    <a:masterClrMapping/>
+  </p:clrMapOvr>
+</p:sld>
+</file>
+
+<file path=ppt/slides/slide9.xml><?xml version="1.0" encoding="utf-8"?>
+<p:sld xmlns:a="http://schemas.openxmlformats.org/drawingml/2006/main" xmlns:r="http://schemas.openxmlformats.org/officeDocument/2006/relationships" xmlns:p="http://schemas.openxmlformats.org/presentationml/2006/main">
+  <p:cSld>
+    <p:spTree>
+      <p:nvGrpSpPr>
+        <p:cNvPr id="1" name=""/>
+        <p:cNvGrpSpPr/>
+        <p:nvPr/>
+      </p:nvGrpSpPr>
+      <p:grpSpPr>
+        <a:xfrm>
+          <a:off x="0" y="0"/>
+          <a:ext cx="0" cy="0"/>
+          <a:chOff x="0" y="0"/>
+          <a:chExt cx="0" cy="0"/>
+        </a:xfrm>
+      </p:grpSpPr>
+      <p:sp>
+        <p:nvSpPr>
+          <p:cNvPr id="2" name="Title 1">
+            <a:extLst>
+              <a:ext uri="{FF2B5EF4-FFF2-40B4-BE49-F238E27FC236}">
+                <a16:creationId xmlns:a16="http://schemas.microsoft.com/office/drawing/2014/main" id="{A7065110-E31B-FCDE-B335-AEB65D6C5365}"/>
+              </a:ext>
+            </a:extLst>
+          </p:cNvPr>
+          <p:cNvSpPr>
+            <a:spLocks noGrp="1"/>
+          </p:cNvSpPr>
+          <p:nvPr>
+            <p:ph type="title"/>
+          </p:nvPr>
+        </p:nvSpPr>
+        <p:spPr/>
+        <p:txBody>
+          <a:bodyPr/>
+          <a:lstStyle/>
+          <a:p>
+            <a:r>
+              <a:rPr lang="en-US" dirty="0"/>
+              <a:t>Tasks for next week</a:t>
+            </a:r>
+          </a:p>
+        </p:txBody>
+      </p:sp>
+      <p:sp>
+        <p:nvSpPr>
+          <p:cNvPr id="3" name="Content Placeholder 2">
+            <a:extLst>
+              <a:ext uri="{FF2B5EF4-FFF2-40B4-BE49-F238E27FC236}">
+                <a16:creationId xmlns:a16="http://schemas.microsoft.com/office/drawing/2014/main" id="{7C30AE4C-D4FB-4897-7A1D-60A71232A007}"/>
+              </a:ext>
+            </a:extLst>
+          </p:cNvPr>
+          <p:cNvSpPr>
+            <a:spLocks noGrp="1"/>
+          </p:cNvSpPr>
+          <p:nvPr>
+            <p:ph idx="1"/>
+          </p:nvPr>
+        </p:nvSpPr>
+        <p:spPr/>
+        <p:txBody>
+          <a:bodyPr/>
+          <a:lstStyle/>
+          <a:p>
+            <a:r>
+              <a:rPr lang="en-US" dirty="0"/>
+              <a:t>Perform an in-depth analysis on the 2009 </a:t>
+            </a:r>
+            <a:r>
+              <a:rPr lang="en-US" dirty="0" err="1"/>
+              <a:t>Balbi</a:t>
+            </a:r>
+            <a:r>
+              <a:rPr lang="en-US" dirty="0"/>
+              <a:t> paper (like what we did in our meeting </a:t>
+            </a:r>
+            <a:r>
+              <a:rPr lang="en-US" dirty="0" err="1"/>
+              <a:t>Aurélien</a:t>
+            </a:r>
+            <a:r>
+              <a:rPr lang="en-US" dirty="0"/>
+              <a:t>)</a:t>
+            </a:r>
+          </a:p>
+          <a:p>
+            <a:r>
+              <a:rPr lang="en-US" dirty="0"/>
+              <a:t>Analyze the wind speeds from the 10m and 5m resolution simulations</a:t>
+            </a:r>
+          </a:p>
+          <a:p>
+            <a:r>
+              <a:rPr lang="en-US" dirty="0"/>
+              <a:t>Analyze the fire-induced circulations at the head fire (using the main tower and East tower)</a:t>
+            </a:r>
+          </a:p>
+          <a:p>
+            <a:r>
+              <a:rPr lang="en-US" dirty="0"/>
+              <a:t>Look at flanks/backfire of the burn (wind speed, temperature, ROS) </a:t>
+            </a:r>
+          </a:p>
+          <a:p>
+            <a:r>
+              <a:rPr lang="en-US" dirty="0"/>
+              <a:t>Begin working on </a:t>
+            </a:r>
+            <a:r>
+              <a:rPr lang="en-US" dirty="0" err="1"/>
+              <a:t>nasa</a:t>
+            </a:r>
+            <a:r>
+              <a:rPr lang="en-US" dirty="0"/>
+              <a:t> server now that I have more storage</a:t>
+            </a:r>
+          </a:p>
+          <a:p>
+            <a:endParaRPr lang="en-US" dirty="0"/>
+          </a:p>
+        </p:txBody>
+      </p:sp>
+    </p:spTree>
+    <p:extLst>
+      <p:ext uri="{BB962C8B-B14F-4D97-AF65-F5344CB8AC3E}">
+        <p14:creationId xmlns:p14="http://schemas.microsoft.com/office/powerpoint/2010/main" val="3724935535"/>
       </p:ext>
     </p:extLst>
   </p:cSld>

</xml_diff>